<commit_message>
@date 2018.4.17 @author zzf @description sync
</commit_message>
<xml_diff>
--- a/figures/evalution/capture+tool+graph.pptx
+++ b/figures/evalution/capture+tool+graph.pptx
@@ -108,7 +108,7 @@
   </p:defaultTextStyle>
   <p:extLst>
     <p:ext uri="{EFAFB233-063F-42B5-8137-9DF3F51BA10A}">
-      <p15:sldGuideLst xmlns:p15="http://schemas.microsoft.com/office/powerpoint/2012/main">
+      <p15:sldGuideLst xmlns:p15="http://schemas.microsoft.com/office/powerpoint/2012/main" xmlns="">
         <p15:guide id="1" orient="horz" pos="2160">
           <p15:clr>
             <a:srgbClr val="A4A3A4"/>
@@ -307,7 +307,7 @@
             <a:fld id="{530820CF-B880-4189-942D-D702A7CBA730}" type="datetimeFigureOut">
               <a:rPr lang="zh-CN" altLang="en-US" smtClean="0"/>
               <a:pPr/>
-              <a:t>2018/1/13</a:t>
+              <a:t>2018/4/14</a:t>
             </a:fld>
             <a:endParaRPr lang="zh-CN" altLang="en-US"/>
           </a:p>
@@ -474,7 +474,7 @@
             <a:fld id="{530820CF-B880-4189-942D-D702A7CBA730}" type="datetimeFigureOut">
               <a:rPr lang="zh-CN" altLang="en-US" smtClean="0"/>
               <a:pPr/>
-              <a:t>2018/1/13</a:t>
+              <a:t>2018/4/14</a:t>
             </a:fld>
             <a:endParaRPr lang="zh-CN" altLang="en-US"/>
           </a:p>
@@ -651,7 +651,7 @@
             <a:fld id="{530820CF-B880-4189-942D-D702A7CBA730}" type="datetimeFigureOut">
               <a:rPr lang="zh-CN" altLang="en-US" smtClean="0"/>
               <a:pPr/>
-              <a:t>2018/1/13</a:t>
+              <a:t>2018/4/14</a:t>
             </a:fld>
             <a:endParaRPr lang="zh-CN" altLang="en-US"/>
           </a:p>
@@ -818,7 +818,7 @@
             <a:fld id="{530820CF-B880-4189-942D-D702A7CBA730}" type="datetimeFigureOut">
               <a:rPr lang="zh-CN" altLang="en-US" smtClean="0"/>
               <a:pPr/>
-              <a:t>2018/1/13</a:t>
+              <a:t>2018/4/14</a:t>
             </a:fld>
             <a:endParaRPr lang="zh-CN" altLang="en-US"/>
           </a:p>
@@ -1061,7 +1061,7 @@
             <a:fld id="{530820CF-B880-4189-942D-D702A7CBA730}" type="datetimeFigureOut">
               <a:rPr lang="zh-CN" altLang="en-US" smtClean="0"/>
               <a:pPr/>
-              <a:t>2018/1/13</a:t>
+              <a:t>2018/4/14</a:t>
             </a:fld>
             <a:endParaRPr lang="zh-CN" altLang="en-US"/>
           </a:p>
@@ -1346,7 +1346,7 @@
             <a:fld id="{530820CF-B880-4189-942D-D702A7CBA730}" type="datetimeFigureOut">
               <a:rPr lang="zh-CN" altLang="en-US" smtClean="0"/>
               <a:pPr/>
-              <a:t>2018/1/13</a:t>
+              <a:t>2018/4/14</a:t>
             </a:fld>
             <a:endParaRPr lang="zh-CN" altLang="en-US"/>
           </a:p>
@@ -1765,7 +1765,7 @@
             <a:fld id="{530820CF-B880-4189-942D-D702A7CBA730}" type="datetimeFigureOut">
               <a:rPr lang="zh-CN" altLang="en-US" smtClean="0"/>
               <a:pPr/>
-              <a:t>2018/1/13</a:t>
+              <a:t>2018/4/14</a:t>
             </a:fld>
             <a:endParaRPr lang="zh-CN" altLang="en-US"/>
           </a:p>
@@ -1880,7 +1880,7 @@
             <a:fld id="{530820CF-B880-4189-942D-D702A7CBA730}" type="datetimeFigureOut">
               <a:rPr lang="zh-CN" altLang="en-US" smtClean="0"/>
               <a:pPr/>
-              <a:t>2018/1/13</a:t>
+              <a:t>2018/4/14</a:t>
             </a:fld>
             <a:endParaRPr lang="zh-CN" altLang="en-US"/>
           </a:p>
@@ -1972,7 +1972,7 @@
             <a:fld id="{530820CF-B880-4189-942D-D702A7CBA730}" type="datetimeFigureOut">
               <a:rPr lang="zh-CN" altLang="en-US" smtClean="0"/>
               <a:pPr/>
-              <a:t>2018/1/13</a:t>
+              <a:t>2018/4/14</a:t>
             </a:fld>
             <a:endParaRPr lang="zh-CN" altLang="en-US"/>
           </a:p>
@@ -2246,7 +2246,7 @@
             <a:fld id="{530820CF-B880-4189-942D-D702A7CBA730}" type="datetimeFigureOut">
               <a:rPr lang="zh-CN" altLang="en-US" smtClean="0"/>
               <a:pPr/>
-              <a:t>2018/1/13</a:t>
+              <a:t>2018/4/14</a:t>
             </a:fld>
             <a:endParaRPr lang="zh-CN" altLang="en-US"/>
           </a:p>
@@ -2496,7 +2496,7 @@
             <a:fld id="{530820CF-B880-4189-942D-D702A7CBA730}" type="datetimeFigureOut">
               <a:rPr lang="zh-CN" altLang="en-US" smtClean="0"/>
               <a:pPr/>
-              <a:t>2018/1/13</a:t>
+              <a:t>2018/4/14</a:t>
             </a:fld>
             <a:endParaRPr lang="zh-CN" altLang="en-US"/>
           </a:p>
@@ -2706,7 +2706,7 @@
             <a:fld id="{530820CF-B880-4189-942D-D702A7CBA730}" type="datetimeFigureOut">
               <a:rPr lang="zh-CN" altLang="en-US" smtClean="0"/>
               <a:pPr/>
-              <a:t>2018/1/13</a:t>
+              <a:t>2018/4/14</a:t>
             </a:fld>
             <a:endParaRPr lang="zh-CN" altLang="en-US"/>
           </a:p>
@@ -11001,7 +11001,7 @@
           </a:lstStyle>
           <a:p>
             <a:r>
-              <a:rPr lang="en-US" altLang="zh-CN" sz="1600" b="1" dirty="0" smtClean="0">
+              <a:rPr lang="en-US" altLang="zh-CN" sz="1600" dirty="0" smtClean="0">
                 <a:solidFill>
                   <a:schemeClr val="tx1"/>
                 </a:solidFill>
@@ -11011,7 +11011,7 @@
               <a:t>JVMTI</a:t>
             </a:r>
             <a:r>
-              <a:rPr lang="en-US" altLang="zh-CN" b="1" dirty="0" smtClean="0">
+              <a:rPr lang="en-US" altLang="zh-CN" dirty="0" smtClean="0">
                 <a:solidFill>
                   <a:schemeClr val="tx1"/>
                 </a:solidFill>
@@ -11021,7 +11021,7 @@
               <a:t> </a:t>
             </a:r>
             <a:r>
-              <a:rPr lang="zh-CN" altLang="en-US" sz="1600" b="1" dirty="0" smtClean="0">
+              <a:rPr lang="zh-CN" altLang="en-US" sz="1600" dirty="0" smtClean="0">
                 <a:solidFill>
                   <a:schemeClr val="tx1"/>
                 </a:solidFill>

</xml_diff>